<commit_message>
final ver of speech ppt
</commit_message>
<xml_diff>
--- a/fyp powerpoint/Fyp_revised_v1.1.pptx
+++ b/fyp powerpoint/Fyp_revised_v1.1.pptx
@@ -281,7 +281,7 @@
           <a:p>
             <a:fld id="{2FCBE140-3FA8-49D2-9893-355BF82FB278}" type="datetimeFigureOut">
               <a:rPr lang="en-US" smtClean="0"/>
-              <a:t>11/8/2020</a:t>
+              <a:t>11/9/2020</a:t>
             </a:fld>
             <a:endParaRPr lang="en-US"/>
           </a:p>
@@ -479,7 +479,7 @@
           <a:p>
             <a:fld id="{2FCBE140-3FA8-49D2-9893-355BF82FB278}" type="datetimeFigureOut">
               <a:rPr lang="en-US" smtClean="0"/>
-              <a:t>11/8/2020</a:t>
+              <a:t>11/9/2020</a:t>
             </a:fld>
             <a:endParaRPr lang="en-US"/>
           </a:p>
@@ -687,7 +687,7 @@
           <a:p>
             <a:fld id="{2FCBE140-3FA8-49D2-9893-355BF82FB278}" type="datetimeFigureOut">
               <a:rPr lang="en-US" smtClean="0"/>
-              <a:t>11/8/2020</a:t>
+              <a:t>11/9/2020</a:t>
             </a:fld>
             <a:endParaRPr lang="en-US"/>
           </a:p>
@@ -885,7 +885,7 @@
           <a:p>
             <a:fld id="{2FCBE140-3FA8-49D2-9893-355BF82FB278}" type="datetimeFigureOut">
               <a:rPr lang="en-US" smtClean="0"/>
-              <a:t>11/8/2020</a:t>
+              <a:t>11/9/2020</a:t>
             </a:fld>
             <a:endParaRPr lang="en-US"/>
           </a:p>
@@ -1160,7 +1160,7 @@
           <a:p>
             <a:fld id="{2FCBE140-3FA8-49D2-9893-355BF82FB278}" type="datetimeFigureOut">
               <a:rPr lang="en-US" smtClean="0"/>
-              <a:t>11/8/2020</a:t>
+              <a:t>11/9/2020</a:t>
             </a:fld>
             <a:endParaRPr lang="en-US"/>
           </a:p>
@@ -1425,7 +1425,7 @@
           <a:p>
             <a:fld id="{2FCBE140-3FA8-49D2-9893-355BF82FB278}" type="datetimeFigureOut">
               <a:rPr lang="en-US" smtClean="0"/>
-              <a:t>11/8/2020</a:t>
+              <a:t>11/9/2020</a:t>
             </a:fld>
             <a:endParaRPr lang="en-US"/>
           </a:p>
@@ -1837,7 +1837,7 @@
           <a:p>
             <a:fld id="{2FCBE140-3FA8-49D2-9893-355BF82FB278}" type="datetimeFigureOut">
               <a:rPr lang="en-US" smtClean="0"/>
-              <a:t>11/8/2020</a:t>
+              <a:t>11/9/2020</a:t>
             </a:fld>
             <a:endParaRPr lang="en-US"/>
           </a:p>
@@ -1978,7 +1978,7 @@
           <a:p>
             <a:fld id="{2FCBE140-3FA8-49D2-9893-355BF82FB278}" type="datetimeFigureOut">
               <a:rPr lang="en-US" smtClean="0"/>
-              <a:t>11/8/2020</a:t>
+              <a:t>11/9/2020</a:t>
             </a:fld>
             <a:endParaRPr lang="en-US"/>
           </a:p>
@@ -2091,7 +2091,7 @@
           <a:p>
             <a:fld id="{2FCBE140-3FA8-49D2-9893-355BF82FB278}" type="datetimeFigureOut">
               <a:rPr lang="en-US" smtClean="0"/>
-              <a:t>11/8/2020</a:t>
+              <a:t>11/9/2020</a:t>
             </a:fld>
             <a:endParaRPr lang="en-US"/>
           </a:p>
@@ -2402,7 +2402,7 @@
           <a:p>
             <a:fld id="{2FCBE140-3FA8-49D2-9893-355BF82FB278}" type="datetimeFigureOut">
               <a:rPr lang="en-US" smtClean="0"/>
-              <a:t>11/8/2020</a:t>
+              <a:t>11/9/2020</a:t>
             </a:fld>
             <a:endParaRPr lang="en-US"/>
           </a:p>
@@ -2690,7 +2690,7 @@
           <a:p>
             <a:fld id="{2FCBE140-3FA8-49D2-9893-355BF82FB278}" type="datetimeFigureOut">
               <a:rPr lang="en-US" smtClean="0"/>
-              <a:t>11/8/2020</a:t>
+              <a:t>11/9/2020</a:t>
             </a:fld>
             <a:endParaRPr lang="en-US"/>
           </a:p>
@@ -2931,7 +2931,7 @@
           <a:p>
             <a:fld id="{2FCBE140-3FA8-49D2-9893-355BF82FB278}" type="datetimeFigureOut">
               <a:rPr lang="en-US" smtClean="0"/>
-              <a:t>11/8/2020</a:t>
+              <a:t>11/9/2020</a:t>
             </a:fld>
             <a:endParaRPr lang="en-US"/>
           </a:p>

</xml_diff>